<commit_message>
Slides. Added repo uri.
</commit_message>
<xml_diff>
--- a/Assets/Slides.pptx
+++ b/Assets/Slides.pptx
@@ -139,7 +139,7 @@
 <p1510:revInfo xmlns:a="http://schemas.openxmlformats.org/drawingml/2006/main" xmlns:r="http://schemas.openxmlformats.org/officeDocument/2006/relationships" xmlns:p1510="http://schemas.microsoft.com/office/powerpoint/2015/10/main">
   <p1510:revLst>
     <p1510:client id="{04D6D0B3-1BF1-474B-99C3-CE4000259788}" v="23" dt="2025-10-22T02:39:52.478"/>
-    <p1510:client id="{81A4401C-47EB-40E6-B142-A3EFA0221499}" v="1" dt="2025-10-22T02:44:38.201"/>
+    <p1510:client id="{81A4401C-47EB-40E6-B142-A3EFA0221499}" v="4" dt="2025-10-22T02:50:04.887"/>
   </p1510:revLst>
 </p1510:revInfo>
 </file>
@@ -148,8 +148,8 @@
 <pc:chgInfo xmlns:a="http://schemas.openxmlformats.org/drawingml/2006/main" xmlns:r="http://schemas.openxmlformats.org/officeDocument/2006/relationships" xmlns:ac="http://schemas.microsoft.com/office/drawing/2013/main/command" xmlns:pc="http://schemas.microsoft.com/office/powerpoint/2013/main/command">
   <pc:docChgLst>
     <pc:chgData name="Jose Manuel Espinoza Bone" userId="b1115e5860e640e8" providerId="LiveId" clId="{136AC519-DA2C-4FA6-81C9-5143C421ED4F}"/>
-    <pc:docChg chg="modSld">
-      <pc:chgData name="Jose Manuel Espinoza Bone" userId="b1115e5860e640e8" providerId="LiveId" clId="{136AC519-DA2C-4FA6-81C9-5143C421ED4F}" dt="2025-10-22T02:45:24.152" v="60" actId="404"/>
+    <pc:docChg chg="custSel modSld">
+      <pc:chgData name="Jose Manuel Espinoza Bone" userId="b1115e5860e640e8" providerId="LiveId" clId="{136AC519-DA2C-4FA6-81C9-5143C421ED4F}" dt="2025-10-22T02:50:57.145" v="124" actId="20577"/>
       <pc:docMkLst>
         <pc:docMk/>
       </pc:docMkLst>
@@ -176,18 +176,26 @@
           </ac:picMkLst>
         </pc:picChg>
       </pc:sldChg>
-      <pc:sldChg chg="modSp mod">
-        <pc:chgData name="Jose Manuel Espinoza Bone" userId="b1115e5860e640e8" providerId="LiveId" clId="{136AC519-DA2C-4FA6-81C9-5143C421ED4F}" dt="2025-10-22T02:45:24.152" v="60" actId="404"/>
+      <pc:sldChg chg="addSp modSp mod">
+        <pc:chgData name="Jose Manuel Espinoza Bone" userId="b1115e5860e640e8" providerId="LiveId" clId="{136AC519-DA2C-4FA6-81C9-5143C421ED4F}" dt="2025-10-22T02:50:57.145" v="124" actId="20577"/>
         <pc:sldMkLst>
           <pc:docMk/>
           <pc:sldMk cId="1969787568" sldId="271"/>
         </pc:sldMkLst>
         <pc:spChg chg="mod">
-          <ac:chgData name="Jose Manuel Espinoza Bone" userId="b1115e5860e640e8" providerId="LiveId" clId="{136AC519-DA2C-4FA6-81C9-5143C421ED4F}" dt="2025-10-22T02:45:24.152" v="60" actId="404"/>
+          <ac:chgData name="Jose Manuel Espinoza Bone" userId="b1115e5860e640e8" providerId="LiveId" clId="{136AC519-DA2C-4FA6-81C9-5143C421ED4F}" dt="2025-10-22T02:49:38.119" v="89" actId="20577"/>
           <ac:spMkLst>
             <pc:docMk/>
             <pc:sldMk cId="1969787568" sldId="271"/>
             <ac:spMk id="2" creationId="{8BDF1EDE-5423-435C-B149-87AB1BC22B83}"/>
+          </ac:spMkLst>
+        </pc:spChg>
+        <pc:spChg chg="add mod">
+          <ac:chgData name="Jose Manuel Espinoza Bone" userId="b1115e5860e640e8" providerId="LiveId" clId="{136AC519-DA2C-4FA6-81C9-5143C421ED4F}" dt="2025-10-22T02:50:57.145" v="124" actId="20577"/>
+          <ac:spMkLst>
+            <pc:docMk/>
+            <pc:sldMk cId="1969787568" sldId="271"/>
+            <ac:spMk id="3" creationId="{82DE2466-BBA9-7879-F314-62454898BC74}"/>
           </ac:spMkLst>
         </pc:spChg>
       </pc:sldChg>
@@ -8622,7 +8630,7 @@
         </p:nvSpPr>
         <p:spPr>
           <a:xfrm>
-            <a:off x="4869876" y="2602873"/>
+            <a:off x="3591795" y="2052155"/>
             <a:ext cx="4179570" cy="1524735"/>
           </a:xfrm>
         </p:spPr>
@@ -8638,6 +8646,10 @@
               <a:rPr lang="en-US" sz="7200" dirty="0"/>
               <a:t>RACIAS</a:t>
             </a:r>
+            <a:br>
+              <a:rPr lang="en-US" sz="7200" dirty="0"/>
+            </a:br>
+            <a:endParaRPr lang="en-US" sz="7200" dirty="0"/>
           </a:p>
         </p:txBody>
       </p:sp>
@@ -8673,6 +8685,93 @@
               <a:t>15</a:t>
             </a:fld>
             <a:endParaRPr lang="en-US" dirty="0"/>
+          </a:p>
+        </p:txBody>
+      </p:sp>
+      <p:sp>
+        <p:nvSpPr>
+          <p:cNvPr id="3" name="TextBox 2">
+            <a:extLst>
+              <a:ext uri="{FF2B5EF4-FFF2-40B4-BE49-F238E27FC236}">
+                <a16:creationId xmlns:a16="http://schemas.microsoft.com/office/drawing/2014/main" id="{82DE2466-BBA9-7879-F314-62454898BC74}"/>
+              </a:ext>
+            </a:extLst>
+          </p:cNvPr>
+          <p:cNvSpPr txBox="1"/>
+          <p:nvPr/>
+        </p:nvSpPr>
+        <p:spPr>
+          <a:xfrm>
+            <a:off x="1901536" y="3096491"/>
+            <a:ext cx="7803573" cy="1200329"/>
+          </a:xfrm>
+          <a:prstGeom prst="rect">
+            <a:avLst/>
+          </a:prstGeom>
+          <a:solidFill>
+            <a:srgbClr val="262626">
+              <a:alpha val="94902"/>
+            </a:srgbClr>
+          </a:solidFill>
+        </p:spPr>
+        <p:txBody>
+          <a:bodyPr wrap="square" rtlCol="0">
+            <a:spAutoFit/>
+          </a:bodyPr>
+          <a:lstStyle/>
+          <a:p>
+            <a:r>
+              <a:rPr lang="en-US" dirty="0">
+                <a:solidFill>
+                  <a:schemeClr val="bg1"/>
+                </a:solidFill>
+              </a:rPr>
+              <a:t>Código Fuente </a:t>
+            </a:r>
+            <a:r>
+              <a:rPr lang="en-US" dirty="0" err="1">
+                <a:solidFill>
+                  <a:schemeClr val="bg1"/>
+                </a:solidFill>
+              </a:rPr>
+              <a:t>en</a:t>
+            </a:r>
+            <a:r>
+              <a:rPr lang="en-US" dirty="0">
+                <a:solidFill>
+                  <a:schemeClr val="bg1"/>
+                </a:solidFill>
+              </a:rPr>
+              <a:t>:</a:t>
+            </a:r>
+            <a:br>
+              <a:rPr lang="en-US" dirty="0">
+                <a:solidFill>
+                  <a:schemeClr val="bg1"/>
+                </a:solidFill>
+              </a:rPr>
+            </a:br>
+            <a:r>
+              <a:rPr lang="en-US" dirty="0">
+                <a:solidFill>
+                  <a:schemeClr val="bg1"/>
+                </a:solidFill>
+                <a:hlinkClick r:id="rId3"/>
+              </a:rPr>
+              <a:t>https://github.com/UIDE-Tareas/5-Diseno-Procesos-ETL-Data-Science-Tarea1.git</a:t>
+            </a:r>
+            <a:endParaRPr lang="en-US" dirty="0">
+              <a:solidFill>
+                <a:schemeClr val="bg1"/>
+              </a:solidFill>
+            </a:endParaRPr>
+          </a:p>
+          <a:p>
+            <a:endParaRPr lang="en-US" dirty="0">
+              <a:solidFill>
+                <a:schemeClr val="bg1"/>
+              </a:solidFill>
+            </a:endParaRPr>
           </a:p>
         </p:txBody>
       </p:sp>
@@ -11663,11 +11762,18 @@
 <file path=customXml/itemProps2.xml><?xml version="1.0" encoding="utf-8"?>
 <ds:datastoreItem xmlns:ds="http://schemas.openxmlformats.org/officeDocument/2006/customXml" ds:itemID="{49168DCE-134F-4610-A6AA-88CEBE8D71D2}">
   <ds:schemaRefs>
+    <ds:schemaRef ds:uri="http://schemas.openxmlformats.org/package/2006/metadata/core-properties"/>
+    <ds:schemaRef ds:uri="http://purl.org/dc/elements/1.1/"/>
+    <ds:schemaRef ds:uri="http://schemas.microsoft.com/office/infopath/2007/PartnerControls"/>
+    <ds:schemaRef ds:uri="71af3243-3dd4-4a8d-8c0d-dd76da1f02a5"/>
     <ds:schemaRef ds:uri="http://schemas.microsoft.com/office/2006/metadata/properties"/>
-    <ds:schemaRef ds:uri="http://schemas.microsoft.com/office/infopath/2007/PartnerControls"/>
+    <ds:schemaRef ds:uri="http://schemas.microsoft.com/office/2006/documentManagement/types"/>
+    <ds:schemaRef ds:uri="230e9df3-be65-4c73-a93b-d1236ebd677e"/>
     <ds:schemaRef ds:uri="http://schemas.microsoft.com/sharepoint/v3"/>
-    <ds:schemaRef ds:uri="71af3243-3dd4-4a8d-8c0d-dd76da1f02a5"/>
-    <ds:schemaRef ds:uri="230e9df3-be65-4c73-a93b-d1236ebd677e"/>
+    <ds:schemaRef ds:uri="http://purl.org/dc/dcmitype/"/>
+    <ds:schemaRef ds:uri="16c05727-aa75-4e4a-9b5f-8a80a1165891"/>
+    <ds:schemaRef ds:uri="http://www.w3.org/XML/1998/namespace"/>
+    <ds:schemaRef ds:uri="http://purl.org/dc/terms/"/>
   </ds:schemaRefs>
 </ds:datastoreItem>
 </file>

</xml_diff>